<commit_message>
took out joint regime EEZs
</commit_message>
<xml_diff>
--- a/carib_markdown/modelflow/modelflow2.pptx
+++ b/carib_markdown/modelflow/modelflow2.pptx
@@ -243,7 +243,7 @@
           <a:p>
             <a:fld id="{7A655B81-89BB-0C42-BEB4-BD2FBB00BF4E}" type="datetimeFigureOut">
               <a:rPr lang="en-US" smtClean="0"/>
-              <a:t>5/19/17</a:t>
+              <a:t>5/26/17</a:t>
             </a:fld>
             <a:endParaRPr lang="en-US"/>
           </a:p>
@@ -413,7 +413,7 @@
           <a:p>
             <a:fld id="{7A655B81-89BB-0C42-BEB4-BD2FBB00BF4E}" type="datetimeFigureOut">
               <a:rPr lang="en-US" smtClean="0"/>
-              <a:t>5/19/17</a:t>
+              <a:t>5/26/17</a:t>
             </a:fld>
             <a:endParaRPr lang="en-US"/>
           </a:p>
@@ -593,7 +593,7 @@
           <a:p>
             <a:fld id="{7A655B81-89BB-0C42-BEB4-BD2FBB00BF4E}" type="datetimeFigureOut">
               <a:rPr lang="en-US" smtClean="0"/>
-              <a:t>5/19/17</a:t>
+              <a:t>5/26/17</a:t>
             </a:fld>
             <a:endParaRPr lang="en-US"/>
           </a:p>
@@ -763,7 +763,7 @@
           <a:p>
             <a:fld id="{7A655B81-89BB-0C42-BEB4-BD2FBB00BF4E}" type="datetimeFigureOut">
               <a:rPr lang="en-US" smtClean="0"/>
-              <a:t>5/19/17</a:t>
+              <a:t>5/26/17</a:t>
             </a:fld>
             <a:endParaRPr lang="en-US"/>
           </a:p>
@@ -1009,7 +1009,7 @@
           <a:p>
             <a:fld id="{7A655B81-89BB-0C42-BEB4-BD2FBB00BF4E}" type="datetimeFigureOut">
               <a:rPr lang="en-US" smtClean="0"/>
-              <a:t>5/19/17</a:t>
+              <a:t>5/26/17</a:t>
             </a:fld>
             <a:endParaRPr lang="en-US"/>
           </a:p>
@@ -1241,7 +1241,7 @@
           <a:p>
             <a:fld id="{7A655B81-89BB-0C42-BEB4-BD2FBB00BF4E}" type="datetimeFigureOut">
               <a:rPr lang="en-US" smtClean="0"/>
-              <a:t>5/19/17</a:t>
+              <a:t>5/26/17</a:t>
             </a:fld>
             <a:endParaRPr lang="en-US"/>
           </a:p>
@@ -1608,7 +1608,7 @@
           <a:p>
             <a:fld id="{7A655B81-89BB-0C42-BEB4-BD2FBB00BF4E}" type="datetimeFigureOut">
               <a:rPr lang="en-US" smtClean="0"/>
-              <a:t>5/19/17</a:t>
+              <a:t>5/26/17</a:t>
             </a:fld>
             <a:endParaRPr lang="en-US"/>
           </a:p>
@@ -1726,7 +1726,7 @@
           <a:p>
             <a:fld id="{7A655B81-89BB-0C42-BEB4-BD2FBB00BF4E}" type="datetimeFigureOut">
               <a:rPr lang="en-US" smtClean="0"/>
-              <a:t>5/19/17</a:t>
+              <a:t>5/26/17</a:t>
             </a:fld>
             <a:endParaRPr lang="en-US"/>
           </a:p>
@@ -1821,7 +1821,7 @@
           <a:p>
             <a:fld id="{7A655B81-89BB-0C42-BEB4-BD2FBB00BF4E}" type="datetimeFigureOut">
               <a:rPr lang="en-US" smtClean="0"/>
-              <a:t>5/19/17</a:t>
+              <a:t>5/26/17</a:t>
             </a:fld>
             <a:endParaRPr lang="en-US"/>
           </a:p>
@@ -2098,7 +2098,7 @@
           <a:p>
             <a:fld id="{7A655B81-89BB-0C42-BEB4-BD2FBB00BF4E}" type="datetimeFigureOut">
               <a:rPr lang="en-US" smtClean="0"/>
-              <a:t>5/19/17</a:t>
+              <a:t>5/26/17</a:t>
             </a:fld>
             <a:endParaRPr lang="en-US"/>
           </a:p>
@@ -2351,7 +2351,7 @@
           <a:p>
             <a:fld id="{7A655B81-89BB-0C42-BEB4-BD2FBB00BF4E}" type="datetimeFigureOut">
               <a:rPr lang="en-US" smtClean="0"/>
-              <a:t>5/19/17</a:t>
+              <a:t>5/26/17</a:t>
             </a:fld>
             <a:endParaRPr lang="en-US"/>
           </a:p>
@@ -2564,7 +2564,7 @@
           <a:p>
             <a:fld id="{7A655B81-89BB-0C42-BEB4-BD2FBB00BF4E}" type="datetimeFigureOut">
               <a:rPr lang="en-US" smtClean="0"/>
-              <a:t>5/19/17</a:t>
+              <a:t>5/26/17</a:t>
             </a:fld>
             <a:endParaRPr lang="en-US"/>
           </a:p>
@@ -3429,11 +3429,7 @@
             <a:pPr algn="ctr"/>
             <a:r>
               <a:rPr lang="en-US" b="1" dirty="0" smtClean="0"/>
-              <a:t>National </a:t>
-            </a:r>
-            <a:r>
-              <a:rPr lang="en-US" b="1" dirty="0" smtClean="0"/>
-              <a:t>Supply Curves</a:t>
+              <a:t>National Supply Curves</a:t>
             </a:r>
             <a:endParaRPr lang="en-US" b="1" dirty="0"/>
           </a:p>
@@ -3449,6 +3445,42 @@
           <a:xfrm>
             <a:off x="8651922" y="3680862"/>
             <a:ext cx="700257" cy="307777"/>
+          </a:xfrm>
+          <a:prstGeom prst="rect">
+            <a:avLst/>
+          </a:prstGeom>
+          <a:solidFill>
+            <a:schemeClr val="accent6">
+              <a:lumMod val="40000"/>
+              <a:lumOff val="60000"/>
+            </a:schemeClr>
+          </a:solidFill>
+        </p:spPr>
+        <p:txBody>
+          <a:bodyPr wrap="square" rtlCol="0">
+            <a:spAutoFit/>
+          </a:bodyPr>
+          <a:lstStyle/>
+          <a:p>
+            <a:pPr algn="ctr"/>
+            <a:r>
+              <a:rPr lang="en-US" sz="1400" dirty="0" smtClean="0"/>
+              <a:t>Price</a:t>
+            </a:r>
+            <a:endParaRPr lang="en-US" sz="1400" dirty="0"/>
+          </a:p>
+        </p:txBody>
+      </p:sp>
+      <p:sp>
+        <p:nvSpPr>
+          <p:cNvPr id="21" name="TextBox 20"/>
+          <p:cNvSpPr txBox="1"/>
+          <p:nvPr/>
+        </p:nvSpPr>
+        <p:spPr>
+          <a:xfrm>
+            <a:off x="5711604" y="2583769"/>
+            <a:ext cx="1730536" cy="523220"/>
           </a:xfrm>
           <a:prstGeom prst="rect">
             <a:avLst/>
@@ -3468,52 +3500,12 @@
           <a:p>
             <a:pPr algn="ctr"/>
             <a:r>
-              <a:rPr lang="en-US" sz="1400" dirty="0" smtClean="0"/>
-              <a:t>Price</a:t>
-            </a:r>
-            <a:endParaRPr lang="en-US" sz="1400" dirty="0"/>
-          </a:p>
-        </p:txBody>
-      </p:sp>
-      <p:sp>
-        <p:nvSpPr>
-          <p:cNvPr id="21" name="TextBox 20"/>
-          <p:cNvSpPr txBox="1"/>
-          <p:nvPr/>
-        </p:nvSpPr>
-        <p:spPr>
-          <a:xfrm>
-            <a:off x="5711604" y="2583769"/>
-            <a:ext cx="1730536" cy="523220"/>
-          </a:xfrm>
-          <a:prstGeom prst="rect">
-            <a:avLst/>
-          </a:prstGeom>
-          <a:solidFill>
-            <a:schemeClr val="accent2">
-              <a:lumMod val="40000"/>
-              <a:lumOff val="60000"/>
-            </a:schemeClr>
-          </a:solidFill>
-        </p:spPr>
-        <p:txBody>
-          <a:bodyPr wrap="square" rtlCol="0">
-            <a:spAutoFit/>
-          </a:bodyPr>
-          <a:lstStyle/>
-          <a:p>
-            <a:pPr algn="ctr"/>
-            <a:r>
               <a:rPr lang="en-US" sz="1400" dirty="0"/>
               <a:t>I</a:t>
             </a:r>
             <a:r>
               <a:rPr lang="en-US" sz="1400" dirty="0" smtClean="0"/>
-              <a:t>ndividual </a:t>
-            </a:r>
-            <a:r>
-              <a:rPr lang="en-US" sz="1400" dirty="0" smtClean="0"/>
-              <a:t>farm production (</a:t>
+              <a:t>ndividual farm production (</a:t>
             </a:r>
             <a:r>
               <a:rPr lang="en-US" sz="1400" i="1" dirty="0" smtClean="0"/>
@@ -4041,11 +4033,7 @@
             <a:pPr algn="ctr"/>
             <a:r>
               <a:rPr lang="en-US" sz="1400" dirty="0" smtClean="0"/>
-              <a:t>National</a:t>
-            </a:r>
-            <a:r>
-              <a:rPr lang="en-US" sz="1400" dirty="0" smtClean="0"/>
-              <a:t> Supply (</a:t>
+              <a:t>National Supply (</a:t>
             </a:r>
             <a:r>
               <a:rPr lang="en-US" sz="1400" i="1" dirty="0" smtClean="0"/>
@@ -4458,11 +4446,7 @@
             <a:pPr algn="ctr"/>
             <a:r>
               <a:rPr lang="en-US" sz="1400" dirty="0" smtClean="0"/>
-              <a:t>National</a:t>
-            </a:r>
-            <a:r>
-              <a:rPr lang="en-US" sz="1400" dirty="0" smtClean="0"/>
-              <a:t> Supply (</a:t>
+              <a:t>National Supply (</a:t>
             </a:r>
             <a:r>
               <a:rPr lang="en-US" sz="1400" i="1" dirty="0" smtClean="0"/>

</xml_diff>